<commit_message>
Remove time-specific parts of presentation
</commit_message>
<xml_diff>
--- a/introduction/pynoon_introduction.pptx
+++ b/introduction/pynoon_introduction.pptx
@@ -7792,7 +7792,7 @@
             </a:br>
             <a:r>
               <a:rPr lang="en-GB"/>
-              <a:t>within the 10-week course</a:t>
+              <a:t>within the timeframe of the course</a:t>
             </a:r>
             <a:endParaRPr/>
           </a:p>
@@ -8234,27 +8234,6 @@
             <a:r>
               <a:rPr lang="en-GB" sz="2200"/>
               <a:t>Find out what other people want to use Python for</a:t>
-            </a:r>
-            <a:endParaRPr sz="2200"/>
-          </a:p>
-          <a:p>
-            <a:pPr indent="-368300" lvl="0" marL="457200" rtl="0" algn="l">
-              <a:spcBef>
-                <a:spcPts val="0"/>
-              </a:spcBef>
-              <a:spcAft>
-                <a:spcPts val="0"/>
-              </a:spcAft>
-              <a:buSzPts val="2200"/>
-              <a:buChar char="●"/>
-            </a:pPr>
-            <a:r>
-              <a:rPr b="1" lang="en-GB" sz="2200"/>
-              <a:t>The</a:t>
-            </a:r>
-            <a:r>
-              <a:rPr b="1" lang="en-GB" sz="2200"/>
-              <a:t> tutorial will start at 12:30</a:t>
             </a:r>
             <a:endParaRPr b="1" sz="2200"/>
           </a:p>

</xml_diff>